<commit_message>
Deployed fd9282e with MkDocs version: 1.1.2
</commit_message>
<xml_diff>
--- a/slides/Unit4_Types.pptx
+++ b/slides/Unit4_Types.pptx
@@ -5,10 +5,10 @@
     <p:sldMasterId id="2147485087" r:id="rId1"/>
   </p:sldMasterIdLst>
   <p:notesMasterIdLst>
-    <p:notesMasterId r:id="rId10"/>
+    <p:notesMasterId r:id="rId11"/>
   </p:notesMasterIdLst>
   <p:handoutMasterIdLst>
-    <p:handoutMasterId r:id="rId11"/>
+    <p:handoutMasterId r:id="rId12"/>
   </p:handoutMasterIdLst>
   <p:sldIdLst>
     <p:sldId id="256" r:id="rId2"/>
@@ -17,8 +17,9 @@
     <p:sldId id="509" r:id="rId5"/>
     <p:sldId id="510" r:id="rId6"/>
     <p:sldId id="524" r:id="rId7"/>
-    <p:sldId id="525" r:id="rId8"/>
-    <p:sldId id="526" r:id="rId9"/>
+    <p:sldId id="527" r:id="rId8"/>
+    <p:sldId id="525" r:id="rId9"/>
+    <p:sldId id="526" r:id="rId10"/>
   </p:sldIdLst>
   <p:sldSz cx="9144000" cy="6858000" type="screen4x3"/>
   <p:notesSz cx="7010400" cy="9296400"/>
@@ -654,7 +655,7 @@
               <a:pPr>
                 <a:defRPr/>
               </a:pPr>
-              <a:t>1/13/2021</a:t>
+              <a:t>1/18/2021</a:t>
             </a:fld>
             <a:endParaRPr lang="en-US"/>
           </a:p>
@@ -1668,6 +1669,122 @@
     </p:spTree>
     <p:extLst>
       <p:ext uri="{BB962C8B-B14F-4D97-AF65-F5344CB8AC3E}">
+        <p14:creationId xmlns:p14="http://schemas.microsoft.com/office/powerpoint/2010/main" val="3586307553"/>
+      </p:ext>
+    </p:extLst>
+  </p:cSld>
+  <p:clrMapOvr>
+    <a:masterClrMapping/>
+  </p:clrMapOvr>
+</p:notes>
+</file>
+
+<file path=ppt/notesSlides/notesSlide8.xml><?xml version="1.0" encoding="utf-8"?>
+<p:notes xmlns:a="http://schemas.openxmlformats.org/drawingml/2006/main" xmlns:r="http://schemas.openxmlformats.org/officeDocument/2006/relationships" xmlns:p="http://schemas.openxmlformats.org/presentationml/2006/main">
+  <p:cSld>
+    <p:spTree>
+      <p:nvGrpSpPr>
+        <p:cNvPr id="1" name=""/>
+        <p:cNvGrpSpPr/>
+        <p:nvPr/>
+      </p:nvGrpSpPr>
+      <p:grpSpPr>
+        <a:xfrm>
+          <a:off x="0" y="0"/>
+          <a:ext cx="0" cy="0"/>
+          <a:chOff x="0" y="0"/>
+          <a:chExt cx="0" cy="0"/>
+        </a:xfrm>
+      </p:grpSpPr>
+      <p:sp>
+        <p:nvSpPr>
+          <p:cNvPr id="74754" name="Rectangle 2"/>
+          <p:cNvSpPr>
+            <a:spLocks noGrp="1" noChangeArrowheads="1"/>
+          </p:cNvSpPr>
+          <p:nvPr>
+            <p:ph type="hdr" sz="quarter"/>
+          </p:nvPr>
+        </p:nvSpPr>
+        <p:spPr bwMode="auto">
+          <a:xfrm>
+            <a:off x="0" y="0"/>
+            <a:ext cx="3038786" cy="465341"/>
+          </a:xfrm>
+          <a:noFill/>
+          <a:ln>
+            <a:miter lim="800000"/>
+            <a:headEnd/>
+            <a:tailEnd/>
+          </a:ln>
+        </p:spPr>
+        <p:txBody>
+          <a:bodyPr wrap="square" numCol="1" anchor="t" anchorCtr="0" compatLnSpc="1">
+            <a:prstTxWarp prst="textNoShape">
+              <a:avLst/>
+            </a:prstTxWarp>
+          </a:bodyPr>
+          <a:lstStyle/>
+          <a:p>
+            <a:r>
+              <a:rPr lang="en-US"/>
+              <a:t>CS1010 Programming Methodology</a:t>
+            </a:r>
+          </a:p>
+        </p:txBody>
+      </p:sp>
+      <p:sp>
+        <p:nvSpPr>
+          <p:cNvPr id="74755" name="Rectangle 2"/>
+          <p:cNvSpPr>
+            <a:spLocks noGrp="1" noRot="1" noChangeAspect="1" noChangeArrowheads="1" noTextEdit="1"/>
+          </p:cNvSpPr>
+          <p:nvPr>
+            <p:ph type="sldImg"/>
+          </p:nvPr>
+        </p:nvSpPr>
+        <p:spPr bwMode="auto">
+          <a:xfrm>
+            <a:off x="1182688" y="696913"/>
+            <a:ext cx="4648200" cy="3486150"/>
+          </a:xfrm>
+          <a:noFill/>
+          <a:ln>
+            <a:solidFill>
+              <a:srgbClr val="000000"/>
+            </a:solidFill>
+            <a:miter lim="800000"/>
+            <a:headEnd/>
+            <a:tailEnd/>
+          </a:ln>
+        </p:spPr>
+      </p:sp>
+      <p:sp>
+        <p:nvSpPr>
+          <p:cNvPr id="74756" name="Rectangle 3"/>
+          <p:cNvSpPr>
+            <a:spLocks noGrp="1" noChangeArrowheads="1"/>
+          </p:cNvSpPr>
+          <p:nvPr>
+            <p:ph type="body" idx="1"/>
+          </p:nvPr>
+        </p:nvSpPr>
+        <p:spPr>
+          <a:noFill/>
+          <a:ln w="9525"/>
+        </p:spPr>
+        <p:txBody>
+          <a:bodyPr/>
+          <a:lstStyle/>
+          <a:p>
+            <a:pPr eaLnBrk="1" hangingPunct="1"/>
+            <a:endParaRPr lang="en-US"/>
+          </a:p>
+        </p:txBody>
+      </p:sp>
+    </p:spTree>
+    <p:extLst>
+      <p:ext uri="{BB962C8B-B14F-4D97-AF65-F5344CB8AC3E}">
         <p14:creationId xmlns:p14="http://schemas.microsoft.com/office/powerpoint/2010/main" val="1416280103"/>
       </p:ext>
     </p:extLst>
@@ -1678,7 +1795,7 @@
 </p:notes>
 </file>
 
-<file path=ppt/notesSlides/notesSlide8.xml><?xml version="1.0" encoding="utf-8"?>
+<file path=ppt/notesSlides/notesSlide9.xml><?xml version="1.0" encoding="utf-8"?>
 <p:notes xmlns:a="http://schemas.openxmlformats.org/drawingml/2006/main" xmlns:r="http://schemas.openxmlformats.org/officeDocument/2006/relationships" xmlns:p="http://schemas.openxmlformats.org/presentationml/2006/main">
   <p:cSld>
     <p:spTree>
@@ -5400,23 +5517,8 @@
                 </a:solidFill>
                 <a:latin typeface="Calibri" panose="020F0502020204030204" pitchFamily="34" charset="0"/>
               </a:rPr>
-              <a:t>UNIT </a:t>
-            </a:r>
-            <a:r>
-              <a:rPr lang="en-US" sz="2400" dirty="0">
-                <a:solidFill>
-                  <a:srgbClr val="C00000"/>
-                </a:solidFill>
-                <a:latin typeface="Calibri" panose="020F0502020204030204" pitchFamily="34" charset="0"/>
-              </a:rPr>
-              <a:t>4</a:t>
-            </a:r>
-            <a:endParaRPr lang="en-US" sz="2400" dirty="0">
-              <a:solidFill>
-                <a:srgbClr val="C00000"/>
-              </a:solidFill>
-              <a:latin typeface="Calibri" panose="020F0502020204030204" pitchFamily="34" charset="0"/>
-            </a:endParaRPr>
+              <a:t>UNIT 4</a:t>
+            </a:r>
           </a:p>
         </p:txBody>
       </p:sp>
@@ -5960,13 +6062,8 @@
             </a:pPr>
             <a:r>
               <a:rPr lang="en-US" sz="2800" dirty="0" smtClean="0"/>
-              <a:t>All data </a:t>
-            </a:r>
-            <a:r>
-              <a:rPr lang="en-US" sz="2800" dirty="0" smtClean="0"/>
-              <a:t>are just 0s and 1s in a computer</a:t>
-            </a:r>
-            <a:endParaRPr lang="en-US" sz="2800" dirty="0" smtClean="0"/>
+              <a:t>All data are just 0s and 1s in a computer</a:t>
+            </a:r>
           </a:p>
           <a:p>
             <a:pPr marL="800100" lvl="1" indent="-342900">
@@ -5987,7 +6084,6 @@
               <a:rPr lang="en-US" sz="2400" dirty="0" smtClean="0"/>
               <a:t>0010101011001001…</a:t>
             </a:r>
-            <a:endParaRPr lang="en-US" sz="2400" dirty="0" smtClean="0"/>
           </a:p>
           <a:p>
             <a:pPr marL="800100" lvl="1" indent="-342900">
@@ -7273,7 +7369,15 @@
             </a:pPr>
             <a:r>
               <a:rPr lang="en-US" sz="2400" dirty="0" smtClean="0"/>
-              <a:t>32 bit (4 bytes): Unicode characters (e.g. letters, emoticons, Mahjong tiles)</a:t>
+              <a:t>32 </a:t>
+            </a:r>
+            <a:r>
+              <a:rPr lang="en-US" sz="2400" dirty="0" smtClean="0"/>
+              <a:t>bits (4 </a:t>
+            </a:r>
+            <a:r>
+              <a:rPr lang="en-US" sz="2400" dirty="0" smtClean="0"/>
+              <a:t>bytes): Unicode characters (e.g. letters, emoticons, Mahjong tiles)</a:t>
             </a:r>
             <a:endParaRPr lang="en-US" sz="2000" dirty="0"/>
           </a:p>
@@ -7435,7 +7539,7 @@
                   <a:srgbClr val="0000FF"/>
                 </a:solidFill>
               </a:rPr>
-              <a:t>Type declaration</a:t>
+              <a:t>Types</a:t>
             </a:r>
             <a:endParaRPr lang="en-GB" dirty="0">
               <a:solidFill>
@@ -7554,8 +7658,65 @@
             </a:pPr>
             <a:r>
               <a:rPr lang="en-US" sz="2800" dirty="0" smtClean="0"/>
-              <a:t>Declare the type of a variable so that the computer can</a:t>
-            </a:r>
+              <a:t>How </a:t>
+            </a:r>
+            <a:r>
+              <a:rPr lang="en-US" sz="2800" dirty="0"/>
+              <a:t>to interpret </a:t>
+            </a:r>
+            <a:r>
+              <a:rPr lang="en-US" sz="2800" dirty="0" smtClean="0"/>
+              <a:t>0010101011001001…?</a:t>
+            </a:r>
+            <a:endParaRPr lang="en-US" sz="2800" dirty="0"/>
+          </a:p>
+          <a:p>
+            <a:pPr>
+              <a:spcBef>
+                <a:spcPts val="1200"/>
+              </a:spcBef>
+              <a:buClr>
+                <a:schemeClr val="accent4">
+                  <a:lumMod val="60000"/>
+                  <a:lumOff val="40000"/>
+                </a:schemeClr>
+              </a:buClr>
+              <a:buSzPct val="75000"/>
+            </a:pPr>
+            <a:r>
+              <a:rPr lang="en-US" sz="2800" dirty="0" smtClean="0"/>
+              <a:t> </a:t>
+            </a:r>
+            <a:endParaRPr lang="en-US" sz="1200" dirty="0" smtClean="0"/>
+          </a:p>
+          <a:p>
+            <a:pPr marL="342900" indent="-342900">
+              <a:spcBef>
+                <a:spcPts val="1200"/>
+              </a:spcBef>
+              <a:buClr>
+                <a:schemeClr val="accent4">
+                  <a:lumMod val="60000"/>
+                  <a:lumOff val="40000"/>
+                </a:schemeClr>
+              </a:buClr>
+              <a:buSzPct val="75000"/>
+              <a:buFont typeface="Wingdings" pitchFamily="2" charset="2"/>
+              <a:buChar char="n"/>
+            </a:pPr>
+            <a:r>
+              <a:rPr lang="en-US" sz="2800" dirty="0" smtClean="0">
+                <a:solidFill>
+                  <a:srgbClr val="0000FF"/>
+                </a:solidFill>
+              </a:rPr>
+              <a:t>Real numbers</a:t>
+            </a:r>
+            <a:endParaRPr lang="en-US" sz="2800" dirty="0">
+              <a:solidFill>
+                <a:srgbClr val="0000FF"/>
+              </a:solidFill>
+            </a:endParaRPr>
           </a:p>
           <a:p>
             <a:pPr marL="800100" lvl="1" indent="-342900">
@@ -7574,8 +7735,29 @@
             </a:pPr>
             <a:r>
               <a:rPr lang="en-US" sz="2400" dirty="0" smtClean="0"/>
-              <a:t>Allocate the right number of bits in memory</a:t>
-            </a:r>
+              <a:t>32 bits or 64 bits</a:t>
+            </a:r>
+          </a:p>
+          <a:p>
+            <a:pPr marL="1257300" lvl="2" indent="-342900">
+              <a:spcBef>
+                <a:spcPts val="1200"/>
+              </a:spcBef>
+              <a:buClr>
+                <a:schemeClr val="accent4">
+                  <a:lumMod val="60000"/>
+                  <a:lumOff val="40000"/>
+                </a:schemeClr>
+              </a:buClr>
+              <a:buSzPct val="75000"/>
+              <a:buFont typeface="Wingdings" pitchFamily="2" charset="2"/>
+              <a:buChar char="n"/>
+            </a:pPr>
+            <a:r>
+              <a:rPr lang="en-US" sz="2000" dirty="0" smtClean="0"/>
+              <a:t>Not all real numbers can be represented accurately…</a:t>
+            </a:r>
+            <a:endParaRPr lang="en-US" sz="2000" dirty="0"/>
           </a:p>
           <a:p>
             <a:pPr marL="800100" lvl="1" indent="-342900">
@@ -7592,223 +7774,6 @@
               <a:buFont typeface="Wingdings" pitchFamily="2" charset="2"/>
               <a:buChar char="n"/>
             </a:pPr>
-            <a:r>
-              <a:rPr lang="en-US" sz="2400" dirty="0" smtClean="0"/>
-              <a:t>Interpreter the value accordingly</a:t>
-            </a:r>
-            <a:endParaRPr lang="en-US" sz="2400" dirty="0"/>
-          </a:p>
-          <a:p>
-            <a:pPr>
-              <a:spcBef>
-                <a:spcPts val="1200"/>
-              </a:spcBef>
-              <a:buClr>
-                <a:schemeClr val="accent4">
-                  <a:lumMod val="60000"/>
-                  <a:lumOff val="40000"/>
-                </a:schemeClr>
-              </a:buClr>
-              <a:buSzPct val="75000"/>
-            </a:pPr>
-            <a:r>
-              <a:rPr lang="en-US" sz="2800" dirty="0" smtClean="0"/>
-              <a:t> </a:t>
-            </a:r>
-            <a:endParaRPr lang="en-US" sz="1200" dirty="0" smtClean="0"/>
-          </a:p>
-          <a:p>
-            <a:pPr marL="342900" indent="-342900">
-              <a:spcBef>
-                <a:spcPts val="1200"/>
-              </a:spcBef>
-              <a:buClr>
-                <a:schemeClr val="accent4">
-                  <a:lumMod val="60000"/>
-                  <a:lumOff val="40000"/>
-                </a:schemeClr>
-              </a:buClr>
-              <a:buSzPct val="75000"/>
-              <a:buFont typeface="Wingdings" pitchFamily="2" charset="2"/>
-              <a:buChar char="n"/>
-            </a:pPr>
-            <a:r>
-              <a:rPr lang="en-US" sz="2800" dirty="0" smtClean="0"/>
-              <a:t>Examples of type declarations in C</a:t>
-            </a:r>
-          </a:p>
-          <a:p>
-            <a:pPr marL="800100" lvl="1" indent="-342900">
-              <a:spcBef>
-                <a:spcPts val="1200"/>
-              </a:spcBef>
-              <a:buClr>
-                <a:schemeClr val="accent4">
-                  <a:lumMod val="60000"/>
-                  <a:lumOff val="40000"/>
-                </a:schemeClr>
-              </a:buClr>
-              <a:buSzPct val="75000"/>
-              <a:buFont typeface="Wingdings" pitchFamily="2" charset="2"/>
-              <a:buChar char="n"/>
-            </a:pPr>
-            <a:r>
-              <a:rPr lang="en-US" sz="2800" dirty="0" err="1" smtClean="0">
-                <a:solidFill>
-                  <a:srgbClr val="0000FF"/>
-                </a:solidFill>
-              </a:rPr>
-              <a:t>int</a:t>
-            </a:r>
-            <a:r>
-              <a:rPr lang="en-US" sz="2800" dirty="0" smtClean="0">
-                <a:solidFill>
-                  <a:srgbClr val="0000FF"/>
-                </a:solidFill>
-              </a:rPr>
-              <a:t> value;</a:t>
-            </a:r>
-            <a:r>
-              <a:rPr lang="en-US" sz="2800" dirty="0" smtClean="0"/>
-              <a:t> 2 or 4 bytes, signed</a:t>
-            </a:r>
-          </a:p>
-          <a:p>
-            <a:pPr marL="800100" lvl="1" indent="-342900">
-              <a:spcBef>
-                <a:spcPts val="1200"/>
-              </a:spcBef>
-              <a:buClr>
-                <a:schemeClr val="accent4">
-                  <a:lumMod val="60000"/>
-                  <a:lumOff val="40000"/>
-                </a:schemeClr>
-              </a:buClr>
-              <a:buSzPct val="75000"/>
-              <a:buFont typeface="Wingdings" pitchFamily="2" charset="2"/>
-              <a:buChar char="n"/>
-            </a:pPr>
-            <a:r>
-              <a:rPr lang="en-US" sz="2800" dirty="0" smtClean="0">
-                <a:solidFill>
-                  <a:srgbClr val="0000FF"/>
-                </a:solidFill>
-              </a:rPr>
-              <a:t>char </a:t>
-            </a:r>
-            <a:r>
-              <a:rPr lang="en-US" sz="2800" dirty="0" err="1" smtClean="0">
-                <a:solidFill>
-                  <a:srgbClr val="0000FF"/>
-                </a:solidFill>
-              </a:rPr>
-              <a:t>ch</a:t>
-            </a:r>
-            <a:r>
-              <a:rPr lang="en-US" sz="2800" dirty="0">
-                <a:solidFill>
-                  <a:srgbClr val="0000FF"/>
-                </a:solidFill>
-              </a:rPr>
-              <a:t>;</a:t>
-            </a:r>
-            <a:r>
-              <a:rPr lang="en-US" sz="2800" dirty="0" smtClean="0">
-                <a:solidFill>
-                  <a:srgbClr val="0000FF"/>
-                </a:solidFill>
-              </a:rPr>
-              <a:t> </a:t>
-            </a:r>
-            <a:r>
-              <a:rPr lang="en-US" sz="2800" dirty="0" smtClean="0"/>
-              <a:t>1 byte</a:t>
-            </a:r>
-          </a:p>
-          <a:p>
-            <a:pPr marL="800100" lvl="1" indent="-342900">
-              <a:spcBef>
-                <a:spcPts val="1200"/>
-              </a:spcBef>
-              <a:buClr>
-                <a:schemeClr val="accent4">
-                  <a:lumMod val="60000"/>
-                  <a:lumOff val="40000"/>
-                </a:schemeClr>
-              </a:buClr>
-              <a:buSzPct val="75000"/>
-              <a:buFont typeface="Wingdings" pitchFamily="2" charset="2"/>
-              <a:buChar char="n"/>
-            </a:pPr>
-            <a:r>
-              <a:rPr lang="en-US" sz="2800" dirty="0" smtClean="0">
-                <a:solidFill>
-                  <a:srgbClr val="0000FF"/>
-                </a:solidFill>
-              </a:rPr>
-              <a:t>float </a:t>
-            </a:r>
-            <a:r>
-              <a:rPr lang="en-US" sz="2800" dirty="0" err="1" smtClean="0">
-                <a:solidFill>
-                  <a:srgbClr val="0000FF"/>
-                </a:solidFill>
-              </a:rPr>
-              <a:t>ave</a:t>
-            </a:r>
-            <a:r>
-              <a:rPr lang="en-US" sz="2800" dirty="0">
-                <a:solidFill>
-                  <a:srgbClr val="0000FF"/>
-                </a:solidFill>
-              </a:rPr>
-              <a:t>;</a:t>
-            </a:r>
-            <a:r>
-              <a:rPr lang="en-US" sz="2800" dirty="0" smtClean="0">
-                <a:solidFill>
-                  <a:srgbClr val="0000FF"/>
-                </a:solidFill>
-              </a:rPr>
-              <a:t> </a:t>
-            </a:r>
-            <a:r>
-              <a:rPr lang="en-US" sz="2800" dirty="0" smtClean="0"/>
-              <a:t>4 bytes</a:t>
-            </a:r>
-          </a:p>
-          <a:p>
-            <a:pPr marL="1257300" lvl="2" indent="-342900">
-              <a:spcBef>
-                <a:spcPts val="1200"/>
-              </a:spcBef>
-              <a:buClr>
-                <a:schemeClr val="accent4">
-                  <a:lumMod val="60000"/>
-                  <a:lumOff val="40000"/>
-                </a:schemeClr>
-              </a:buClr>
-              <a:buSzPct val="75000"/>
-              <a:buFont typeface="Wingdings" pitchFamily="2" charset="2"/>
-              <a:buChar char="n"/>
-            </a:pPr>
-            <a:endParaRPr lang="en-US" sz="2400" dirty="0" smtClean="0"/>
-          </a:p>
-          <a:p>
-            <a:pPr marL="800100" lvl="1" indent="-342900">
-              <a:spcBef>
-                <a:spcPts val="1200"/>
-              </a:spcBef>
-              <a:buClr>
-                <a:schemeClr val="accent4">
-                  <a:lumMod val="60000"/>
-                  <a:lumOff val="40000"/>
-                </a:schemeClr>
-              </a:buClr>
-              <a:buSzPct val="75000"/>
-              <a:buFont typeface="Wingdings" pitchFamily="2" charset="2"/>
-              <a:buChar char="n"/>
-            </a:pPr>
             <a:endParaRPr lang="en-US" sz="2400" dirty="0"/>
           </a:p>
         </p:txBody>
@@ -7846,7 +7811,7 @@
     </p:spTree>
     <p:extLst>
       <p:ext uri="{BB962C8B-B14F-4D97-AF65-F5344CB8AC3E}">
-        <p14:creationId xmlns:p14="http://schemas.microsoft.com/office/powerpoint/2010/main" val="3780451803"/>
+        <p14:creationId xmlns:p14="http://schemas.microsoft.com/office/powerpoint/2010/main" val="1309378229"/>
       </p:ext>
     </p:extLst>
   </p:cSld>
@@ -7912,7 +7877,7 @@
                   <a:srgbClr val="0000FF"/>
                 </a:solidFill>
               </a:rPr>
-              <a:t>Homework</a:t>
+              <a:t>Type declaration</a:t>
             </a:r>
             <a:endParaRPr lang="en-GB" dirty="0">
               <a:solidFill>
@@ -7982,6 +7947,483 @@
                 <a:defRPr/>
               </a:pPr>
               <a:t>8</a:t>
+            </a:fld>
+            <a:endParaRPr dirty="0"/>
+          </a:p>
+        </p:txBody>
+      </p:sp>
+      <p:sp>
+        <p:nvSpPr>
+          <p:cNvPr id="10" name="HighlightTextShape201406241503265130"/>
+          <p:cNvSpPr>
+            <a:spLocks noChangeArrowheads="1"/>
+          </p:cNvSpPr>
+          <p:nvPr/>
+        </p:nvSpPr>
+        <p:spPr bwMode="auto">
+          <a:xfrm>
+            <a:off x="491319" y="1219200"/>
+            <a:ext cx="8195481" cy="2438400"/>
+          </a:xfrm>
+          <a:prstGeom prst="rect">
+            <a:avLst/>
+          </a:prstGeom>
+          <a:noFill/>
+          <a:ln w="9525">
+            <a:noFill/>
+            <a:miter lim="800000"/>
+            <a:headEnd/>
+            <a:tailEnd/>
+          </a:ln>
+        </p:spPr>
+        <p:txBody>
+          <a:bodyPr/>
+          <a:lstStyle/>
+          <a:p>
+            <a:pPr marL="342900" indent="-342900">
+              <a:spcBef>
+                <a:spcPts val="1200"/>
+              </a:spcBef>
+              <a:buClr>
+                <a:schemeClr val="accent4">
+                  <a:lumMod val="60000"/>
+                  <a:lumOff val="40000"/>
+                </a:schemeClr>
+              </a:buClr>
+              <a:buSzPct val="75000"/>
+              <a:buFont typeface="Wingdings" pitchFamily="2" charset="2"/>
+              <a:buChar char="n"/>
+            </a:pPr>
+            <a:r>
+              <a:rPr lang="en-US" sz="2800" dirty="0" smtClean="0"/>
+              <a:t>Declare the type of a variable so that the computer can</a:t>
+            </a:r>
+          </a:p>
+          <a:p>
+            <a:pPr marL="800100" lvl="1" indent="-342900">
+              <a:spcBef>
+                <a:spcPts val="1200"/>
+              </a:spcBef>
+              <a:buClr>
+                <a:schemeClr val="accent4">
+                  <a:lumMod val="60000"/>
+                  <a:lumOff val="40000"/>
+                </a:schemeClr>
+              </a:buClr>
+              <a:buSzPct val="75000"/>
+              <a:buFont typeface="Wingdings" pitchFamily="2" charset="2"/>
+              <a:buChar char="n"/>
+            </a:pPr>
+            <a:r>
+              <a:rPr lang="en-US" sz="2400" dirty="0" smtClean="0"/>
+              <a:t>Allocate the right number of bits in memory</a:t>
+            </a:r>
+          </a:p>
+          <a:p>
+            <a:pPr marL="800100" lvl="1" indent="-342900">
+              <a:spcBef>
+                <a:spcPts val="1200"/>
+              </a:spcBef>
+              <a:buClr>
+                <a:schemeClr val="accent4">
+                  <a:lumMod val="60000"/>
+                  <a:lumOff val="40000"/>
+                </a:schemeClr>
+              </a:buClr>
+              <a:buSzPct val="75000"/>
+              <a:buFont typeface="Wingdings" pitchFamily="2" charset="2"/>
+              <a:buChar char="n"/>
+            </a:pPr>
+            <a:r>
+              <a:rPr lang="en-US" sz="2400" dirty="0" smtClean="0"/>
+              <a:t>Interpreter the value accordingly</a:t>
+            </a:r>
+            <a:endParaRPr lang="en-US" sz="2400" dirty="0"/>
+          </a:p>
+          <a:p>
+            <a:pPr>
+              <a:spcBef>
+                <a:spcPts val="1200"/>
+              </a:spcBef>
+              <a:buClr>
+                <a:schemeClr val="accent4">
+                  <a:lumMod val="60000"/>
+                  <a:lumOff val="40000"/>
+                </a:schemeClr>
+              </a:buClr>
+              <a:buSzPct val="75000"/>
+            </a:pPr>
+            <a:r>
+              <a:rPr lang="en-US" sz="2800" dirty="0" smtClean="0"/>
+              <a:t> </a:t>
+            </a:r>
+            <a:endParaRPr lang="en-US" sz="1200" dirty="0" smtClean="0"/>
+          </a:p>
+          <a:p>
+            <a:pPr marL="342900" indent="-342900">
+              <a:spcBef>
+                <a:spcPts val="1200"/>
+              </a:spcBef>
+              <a:buClr>
+                <a:schemeClr val="accent4">
+                  <a:lumMod val="60000"/>
+                  <a:lumOff val="40000"/>
+                </a:schemeClr>
+              </a:buClr>
+              <a:buSzPct val="75000"/>
+              <a:buFont typeface="Wingdings" pitchFamily="2" charset="2"/>
+              <a:buChar char="n"/>
+            </a:pPr>
+            <a:r>
+              <a:rPr lang="en-US" sz="2800" dirty="0" smtClean="0"/>
+              <a:t>Examples of type declarations in C</a:t>
+            </a:r>
+          </a:p>
+          <a:p>
+            <a:pPr marL="800100" lvl="1" indent="-342900">
+              <a:spcBef>
+                <a:spcPts val="1200"/>
+              </a:spcBef>
+              <a:buClr>
+                <a:schemeClr val="accent4">
+                  <a:lumMod val="60000"/>
+                  <a:lumOff val="40000"/>
+                </a:schemeClr>
+              </a:buClr>
+              <a:buSzPct val="75000"/>
+              <a:buFont typeface="Wingdings" pitchFamily="2" charset="2"/>
+              <a:buChar char="n"/>
+            </a:pPr>
+            <a:r>
+              <a:rPr lang="en-US" sz="2400" dirty="0" err="1" smtClean="0">
+                <a:solidFill>
+                  <a:srgbClr val="0000FF"/>
+                </a:solidFill>
+              </a:rPr>
+              <a:t>int</a:t>
+            </a:r>
+            <a:r>
+              <a:rPr lang="en-US" sz="2400" dirty="0" smtClean="0">
+                <a:solidFill>
+                  <a:srgbClr val="0000FF"/>
+                </a:solidFill>
+              </a:rPr>
+              <a:t> value;</a:t>
+            </a:r>
+            <a:r>
+              <a:rPr lang="en-US" sz="2400" dirty="0" smtClean="0"/>
+              <a:t> 2 or 4 bytes, signed</a:t>
+            </a:r>
+          </a:p>
+          <a:p>
+            <a:pPr marL="800100" lvl="1" indent="-342900">
+              <a:spcBef>
+                <a:spcPts val="1200"/>
+              </a:spcBef>
+              <a:buClr>
+                <a:schemeClr val="accent4">
+                  <a:lumMod val="60000"/>
+                  <a:lumOff val="40000"/>
+                </a:schemeClr>
+              </a:buClr>
+              <a:buSzPct val="75000"/>
+              <a:buFont typeface="Wingdings" pitchFamily="2" charset="2"/>
+              <a:buChar char="n"/>
+            </a:pPr>
+            <a:r>
+              <a:rPr lang="en-US" sz="2400" dirty="0" smtClean="0">
+                <a:solidFill>
+                  <a:srgbClr val="0000FF"/>
+                </a:solidFill>
+              </a:rPr>
+              <a:t>char </a:t>
+            </a:r>
+            <a:r>
+              <a:rPr lang="en-US" sz="2400" dirty="0" err="1" smtClean="0">
+                <a:solidFill>
+                  <a:srgbClr val="0000FF"/>
+                </a:solidFill>
+              </a:rPr>
+              <a:t>ch</a:t>
+            </a:r>
+            <a:r>
+              <a:rPr lang="en-US" sz="2400" dirty="0">
+                <a:solidFill>
+                  <a:srgbClr val="0000FF"/>
+                </a:solidFill>
+              </a:rPr>
+              <a:t>;</a:t>
+            </a:r>
+            <a:r>
+              <a:rPr lang="en-US" sz="2400" dirty="0" smtClean="0">
+                <a:solidFill>
+                  <a:srgbClr val="0000FF"/>
+                </a:solidFill>
+              </a:rPr>
+              <a:t> </a:t>
+            </a:r>
+            <a:r>
+              <a:rPr lang="en-US" sz="2400" dirty="0" smtClean="0"/>
+              <a:t>1 byte</a:t>
+            </a:r>
+          </a:p>
+          <a:p>
+            <a:pPr marL="800100" lvl="1" indent="-342900">
+              <a:spcBef>
+                <a:spcPts val="1200"/>
+              </a:spcBef>
+              <a:buClr>
+                <a:schemeClr val="accent4">
+                  <a:lumMod val="60000"/>
+                  <a:lumOff val="40000"/>
+                </a:schemeClr>
+              </a:buClr>
+              <a:buSzPct val="75000"/>
+              <a:buFont typeface="Wingdings" pitchFamily="2" charset="2"/>
+              <a:buChar char="n"/>
+            </a:pPr>
+            <a:r>
+              <a:rPr lang="en-US" sz="2400" dirty="0" smtClean="0">
+                <a:solidFill>
+                  <a:srgbClr val="0000FF"/>
+                </a:solidFill>
+              </a:rPr>
+              <a:t>float </a:t>
+            </a:r>
+            <a:r>
+              <a:rPr lang="en-US" sz="2400" dirty="0" err="1" smtClean="0">
+                <a:solidFill>
+                  <a:srgbClr val="0000FF"/>
+                </a:solidFill>
+              </a:rPr>
+              <a:t>ave</a:t>
+            </a:r>
+            <a:r>
+              <a:rPr lang="en-US" sz="2400" dirty="0">
+                <a:solidFill>
+                  <a:srgbClr val="0000FF"/>
+                </a:solidFill>
+              </a:rPr>
+              <a:t>;</a:t>
+            </a:r>
+            <a:r>
+              <a:rPr lang="en-US" sz="2400" dirty="0" smtClean="0">
+                <a:solidFill>
+                  <a:srgbClr val="0000FF"/>
+                </a:solidFill>
+              </a:rPr>
+              <a:t> </a:t>
+            </a:r>
+            <a:r>
+              <a:rPr lang="en-US" sz="2400" dirty="0" smtClean="0"/>
+              <a:t>4 bytes</a:t>
+            </a:r>
+          </a:p>
+          <a:p>
+            <a:pPr marL="1257300" lvl="2" indent="-342900">
+              <a:spcBef>
+                <a:spcPts val="1200"/>
+              </a:spcBef>
+              <a:buClr>
+                <a:schemeClr val="accent4">
+                  <a:lumMod val="60000"/>
+                  <a:lumOff val="40000"/>
+                </a:schemeClr>
+              </a:buClr>
+              <a:buSzPct val="75000"/>
+              <a:buFont typeface="Wingdings" pitchFamily="2" charset="2"/>
+              <a:buChar char="n"/>
+            </a:pPr>
+            <a:endParaRPr lang="en-US" sz="2400" dirty="0" smtClean="0"/>
+          </a:p>
+          <a:p>
+            <a:pPr marL="800100" lvl="1" indent="-342900">
+              <a:spcBef>
+                <a:spcPts val="1200"/>
+              </a:spcBef>
+              <a:buClr>
+                <a:schemeClr val="accent4">
+                  <a:lumMod val="60000"/>
+                  <a:lumOff val="40000"/>
+                </a:schemeClr>
+              </a:buClr>
+              <a:buSzPct val="75000"/>
+              <a:buFont typeface="Wingdings" pitchFamily="2" charset="2"/>
+              <a:buChar char="n"/>
+            </a:pPr>
+            <a:endParaRPr lang="en-US" sz="2400" dirty="0"/>
+          </a:p>
+        </p:txBody>
+      </p:sp>
+      <p:sp>
+        <p:nvSpPr>
+          <p:cNvPr id="6" name="[Date Placeholder 3]"/>
+          <p:cNvSpPr>
+            <a:spLocks noGrp="1"/>
+          </p:cNvSpPr>
+          <p:nvPr>
+            <p:ph type="dt" sz="half" idx="10"/>
+          </p:nvPr>
+        </p:nvSpPr>
+        <p:spPr>
+          <a:xfrm>
+            <a:off x="457200" y="18288"/>
+            <a:ext cx="2895600" cy="329184"/>
+          </a:xfrm>
+        </p:spPr>
+        <p:txBody>
+          <a:bodyPr/>
+          <a:lstStyle/>
+          <a:p>
+            <a:pPr>
+              <a:defRPr/>
+            </a:pPr>
+            <a:r>
+              <a:rPr lang="en-US" dirty="0"/>
+              <a:t>© NUS</a:t>
+            </a:r>
+          </a:p>
+        </p:txBody>
+      </p:sp>
+    </p:spTree>
+    <p:extLst>
+      <p:ext uri="{BB962C8B-B14F-4D97-AF65-F5344CB8AC3E}">
+        <p14:creationId xmlns:p14="http://schemas.microsoft.com/office/powerpoint/2010/main" val="3780451803"/>
+      </p:ext>
+    </p:extLst>
+  </p:cSld>
+  <p:clrMapOvr>
+    <a:masterClrMapping/>
+  </p:clrMapOvr>
+  <p:transition>
+    <p:fade/>
+  </p:transition>
+  <p:timing>
+    <p:tnLst>
+      <p:par>
+        <p:cTn id="1" dur="indefinite" restart="never" nodeType="tmRoot"/>
+      </p:par>
+    </p:tnLst>
+  </p:timing>
+</p:sld>
+</file>
+
+<file path=ppt/slides/slide9.xml><?xml version="1.0" encoding="utf-8"?>
+<p:sld xmlns:a="http://schemas.openxmlformats.org/drawingml/2006/main" xmlns:r="http://schemas.openxmlformats.org/officeDocument/2006/relationships" xmlns:p="http://schemas.openxmlformats.org/presentationml/2006/main">
+  <p:cSld>
+    <p:spTree>
+      <p:nvGrpSpPr>
+        <p:cNvPr id="1" name=""/>
+        <p:cNvGrpSpPr/>
+        <p:nvPr/>
+      </p:nvGrpSpPr>
+      <p:grpSpPr>
+        <a:xfrm>
+          <a:off x="0" y="0"/>
+          <a:ext cx="0" cy="0"/>
+          <a:chOff x="0" y="0"/>
+          <a:chExt cx="0" cy="0"/>
+        </a:xfrm>
+      </p:grpSpPr>
+      <p:sp>
+        <p:nvSpPr>
+          <p:cNvPr id="24578" name="Rectangle 2"/>
+          <p:cNvSpPr>
+            <a:spLocks noGrp="1" noChangeArrowheads="1"/>
+          </p:cNvSpPr>
+          <p:nvPr>
+            <p:ph type="title"/>
+          </p:nvPr>
+        </p:nvSpPr>
+        <p:spPr>
+          <a:xfrm>
+            <a:off x="533400" y="457200"/>
+            <a:ext cx="8153400" cy="685800"/>
+          </a:xfrm>
+        </p:spPr>
+        <p:txBody>
+          <a:bodyPr>
+            <a:normAutofit fontScale="90000"/>
+          </a:bodyPr>
+          <a:lstStyle/>
+          <a:p>
+            <a:pPr eaLnBrk="1" hangingPunct="1"/>
+            <a:r>
+              <a:rPr lang="en-GB" sz="4000" dirty="0" smtClean="0">
+                <a:solidFill>
+                  <a:srgbClr val="0000FF"/>
+                </a:solidFill>
+              </a:rPr>
+              <a:t>Homework</a:t>
+            </a:r>
+            <a:endParaRPr lang="en-GB" dirty="0">
+              <a:solidFill>
+                <a:srgbClr val="0000FF"/>
+              </a:solidFill>
+            </a:endParaRPr>
+          </a:p>
+        </p:txBody>
+      </p:sp>
+      <p:sp>
+        <p:nvSpPr>
+          <p:cNvPr id="24582" name="Footer Placeholder 41"/>
+          <p:cNvSpPr>
+            <a:spLocks noGrp="1"/>
+          </p:cNvSpPr>
+          <p:nvPr>
+            <p:ph type="ftr" sz="quarter" idx="11"/>
+          </p:nvPr>
+        </p:nvSpPr>
+        <p:spPr>
+          <a:noFill/>
+        </p:spPr>
+        <p:txBody>
+          <a:bodyPr/>
+          <a:lstStyle/>
+          <a:p>
+            <a:pPr algn="l"/>
+            <a:endParaRPr lang="en-US" dirty="0"/>
+          </a:p>
+        </p:txBody>
+      </p:sp>
+      <p:sp>
+        <p:nvSpPr>
+          <p:cNvPr id="43" name="Slide Number Placeholder 42"/>
+          <p:cNvSpPr>
+            <a:spLocks noGrp="1"/>
+          </p:cNvSpPr>
+          <p:nvPr>
+            <p:ph type="sldNum" sz="quarter" idx="12"/>
+          </p:nvPr>
+        </p:nvSpPr>
+        <p:spPr/>
+        <p:txBody>
+          <a:bodyPr>
+            <a:normAutofit/>
+          </a:bodyPr>
+          <a:lstStyle/>
+          <a:p>
+            <a:pPr>
+              <a:defRPr/>
+            </a:pPr>
+            <a:r>
+              <a:rPr lang="en-US" dirty="0" smtClean="0"/>
+              <a:t>Unit4</a:t>
+            </a:r>
+            <a:r>
+              <a:rPr dirty="0" smtClean="0"/>
+              <a:t> </a:t>
+            </a:r>
+            <a:r>
+              <a:rPr dirty="0"/>
+              <a:t>- </a:t>
+            </a:r>
+            <a:fld id="{628B8346-B709-406B-887E-3E0CC6DA1327}" type="slidenum">
+              <a:rPr smtClean="0"/>
+              <a:pPr>
+                <a:defRPr/>
+              </a:pPr>
+              <a:t>9</a:t>
             </a:fld>
             <a:endParaRPr dirty="0"/>
           </a:p>
@@ -8188,11 +8630,7 @@
             </a:r>
             <a:r>
               <a:rPr lang="en-US" sz="2400" dirty="0" smtClean="0"/>
-              <a:t>3.1</a:t>
-            </a:r>
-            <a:r>
-              <a:rPr lang="en-US" sz="2400" dirty="0" smtClean="0"/>
-              <a:t> </a:t>
+              <a:t>3.1 </a:t>
             </a:r>
             <a:r>
               <a:rPr lang="en-US" sz="2400" dirty="0"/>
@@ -8200,11 +8638,7 @@
             </a:r>
             <a:r>
               <a:rPr lang="en-US" sz="2400" dirty="0" smtClean="0"/>
-              <a:t>3.2</a:t>
-            </a:r>
-            <a:r>
-              <a:rPr lang="en-US" sz="2400" dirty="0" smtClean="0"/>
-              <a:t> </a:t>
+              <a:t>3.2 </a:t>
             </a:r>
             <a:r>
               <a:rPr lang="en-US" sz="2400" dirty="0"/>

</xml_diff>